<commit_message>
Chap03: Pictures done until pump B and pw. Most caption to be done.
</commit_message>
<xml_diff>
--- a/03-h-Mn/Articles/hmnres(janvier2017)/Figure5.pptx
+++ b/03-h-Mn/Articles/hmnres(janvier2017)/Figure5.pptx
@@ -192,7 +192,7 @@
           <a:p>
             <a:fld id="{A732596A-CC33-44AB-A517-CD91BCF05E15}" type="datetimeFigureOut">
               <a:rPr lang="en-US" smtClean="0"/>
-              <a:t>2/3/2017</a:t>
+              <a:t>7/11/2017</a:t>
             </a:fld>
             <a:endParaRPr lang="en-US"/>
           </a:p>
@@ -641,7 +641,7 @@
           <a:p>
             <a:fld id="{252CF840-51FB-49D9-ADDC-0C52DA34DC77}" type="datetimeFigureOut">
               <a:rPr lang="en-US" smtClean="0"/>
-              <a:t>2/3/2017</a:t>
+              <a:t>7/11/2017</a:t>
             </a:fld>
             <a:endParaRPr lang="en-US"/>
           </a:p>
@@ -811,7 +811,7 @@
           <a:p>
             <a:fld id="{252CF840-51FB-49D9-ADDC-0C52DA34DC77}" type="datetimeFigureOut">
               <a:rPr lang="en-US" smtClean="0"/>
-              <a:t>2/3/2017</a:t>
+              <a:t>7/11/2017</a:t>
             </a:fld>
             <a:endParaRPr lang="en-US"/>
           </a:p>
@@ -991,7 +991,7 @@
           <a:p>
             <a:fld id="{252CF840-51FB-49D9-ADDC-0C52DA34DC77}" type="datetimeFigureOut">
               <a:rPr lang="en-US" smtClean="0"/>
-              <a:t>2/3/2017</a:t>
+              <a:t>7/11/2017</a:t>
             </a:fld>
             <a:endParaRPr lang="en-US"/>
           </a:p>
@@ -1161,7 +1161,7 @@
           <a:p>
             <a:fld id="{252CF840-51FB-49D9-ADDC-0C52DA34DC77}" type="datetimeFigureOut">
               <a:rPr lang="en-US" smtClean="0"/>
-              <a:t>2/3/2017</a:t>
+              <a:t>7/11/2017</a:t>
             </a:fld>
             <a:endParaRPr lang="en-US"/>
           </a:p>
@@ -1407,7 +1407,7 @@
           <a:p>
             <a:fld id="{252CF840-51FB-49D9-ADDC-0C52DA34DC77}" type="datetimeFigureOut">
               <a:rPr lang="en-US" smtClean="0"/>
-              <a:t>2/3/2017</a:t>
+              <a:t>7/11/2017</a:t>
             </a:fld>
             <a:endParaRPr lang="en-US"/>
           </a:p>
@@ -1695,7 +1695,7 @@
           <a:p>
             <a:fld id="{252CF840-51FB-49D9-ADDC-0C52DA34DC77}" type="datetimeFigureOut">
               <a:rPr lang="en-US" smtClean="0"/>
-              <a:t>2/3/2017</a:t>
+              <a:t>7/11/2017</a:t>
             </a:fld>
             <a:endParaRPr lang="en-US"/>
           </a:p>
@@ -2117,7 +2117,7 @@
           <a:p>
             <a:fld id="{252CF840-51FB-49D9-ADDC-0C52DA34DC77}" type="datetimeFigureOut">
               <a:rPr lang="en-US" smtClean="0"/>
-              <a:t>2/3/2017</a:t>
+              <a:t>7/11/2017</a:t>
             </a:fld>
             <a:endParaRPr lang="en-US"/>
           </a:p>
@@ -2235,7 +2235,7 @@
           <a:p>
             <a:fld id="{252CF840-51FB-49D9-ADDC-0C52DA34DC77}" type="datetimeFigureOut">
               <a:rPr lang="en-US" smtClean="0"/>
-              <a:t>2/3/2017</a:t>
+              <a:t>7/11/2017</a:t>
             </a:fld>
             <a:endParaRPr lang="en-US"/>
           </a:p>
@@ -2330,7 +2330,7 @@
           <a:p>
             <a:fld id="{252CF840-51FB-49D9-ADDC-0C52DA34DC77}" type="datetimeFigureOut">
               <a:rPr lang="en-US" smtClean="0"/>
-              <a:t>2/3/2017</a:t>
+              <a:t>7/11/2017</a:t>
             </a:fld>
             <a:endParaRPr lang="en-US"/>
           </a:p>
@@ -2607,7 +2607,7 @@
           <a:p>
             <a:fld id="{252CF840-51FB-49D9-ADDC-0C52DA34DC77}" type="datetimeFigureOut">
               <a:rPr lang="en-US" smtClean="0"/>
-              <a:t>2/3/2017</a:t>
+              <a:t>7/11/2017</a:t>
             </a:fld>
             <a:endParaRPr lang="en-US"/>
           </a:p>
@@ -2860,7 +2860,7 @@
           <a:p>
             <a:fld id="{252CF840-51FB-49D9-ADDC-0C52DA34DC77}" type="datetimeFigureOut">
               <a:rPr lang="en-US" smtClean="0"/>
-              <a:t>2/3/2017</a:t>
+              <a:t>7/11/2017</a:t>
             </a:fld>
             <a:endParaRPr lang="en-US"/>
           </a:p>
@@ -3073,7 +3073,7 @@
           <a:p>
             <a:fld id="{252CF840-51FB-49D9-ADDC-0C52DA34DC77}" type="datetimeFigureOut">
               <a:rPr lang="en-US" smtClean="0"/>
-              <a:t>2/3/2017</a:t>
+              <a:t>7/11/2017</a:t>
             </a:fld>
             <a:endParaRPr lang="en-US"/>
           </a:p>
@@ -3508,7 +3508,7 @@
         </p:nvSpPr>
         <p:spPr>
           <a:xfrm>
-            <a:off x="3651956" y="107504"/>
+            <a:off x="3519289" y="91183"/>
             <a:ext cx="425116" cy="338554"/>
           </a:xfrm>
           <a:prstGeom prst="rect">
@@ -3624,6 +3624,42 @@
           </a:extLst>
         </p:spPr>
       </p:pic>
+      <p:sp>
+        <p:nvSpPr>
+          <p:cNvPr id="6" name="ZoneTexte 5"/>
+          <p:cNvSpPr txBox="1"/>
+          <p:nvPr/>
+        </p:nvSpPr>
+        <p:spPr>
+          <a:xfrm>
+            <a:off x="481415" y="81658"/>
+            <a:ext cx="413896" cy="338554"/>
+          </a:xfrm>
+          <a:prstGeom prst="rect">
+            <a:avLst/>
+          </a:prstGeom>
+          <a:noFill/>
+        </p:spPr>
+        <p:txBody>
+          <a:bodyPr wrap="none" rtlCol="0">
+            <a:spAutoFit/>
+          </a:bodyPr>
+          <a:lstStyle/>
+          <a:p>
+            <a:r>
+              <a:rPr lang="fr-FR" sz="1600" dirty="0" smtClean="0">
+                <a:latin typeface="Times New Roman" panose="02020603050405020304" pitchFamily="18" charset="0"/>
+                <a:cs typeface="Times New Roman" panose="02020603050405020304" pitchFamily="18" charset="0"/>
+              </a:rPr>
+              <a:t>(a)</a:t>
+            </a:r>
+            <a:endParaRPr lang="en-US" sz="1600" dirty="0">
+              <a:latin typeface="Times New Roman" panose="02020603050405020304" pitchFamily="18" charset="0"/>
+              <a:cs typeface="Times New Roman" panose="02020603050405020304" pitchFamily="18" charset="0"/>
+            </a:endParaRPr>
+          </a:p>
+        </p:txBody>
+      </p:sp>
     </p:spTree>
     <p:extLst>
       <p:ext uri="{BB962C8B-B14F-4D97-AF65-F5344CB8AC3E}">

</xml_diff>